<commit_message>
Implement tri-training except for BERT, ElMo and CNN
</commit_message>
<xml_diff>
--- a/slides/01.26.2021.pptx
+++ b/slides/01.26.2021.pptx
@@ -106,6 +106,11 @@
       </a:defRPr>
     </a:lvl9pPr>
   </p:defaultTextStyle>
+  <p:extLst>
+    <p:ext uri="{EFAFB233-063F-42B5-8137-9DF3F51BA10A}">
+      <p15:sldGuideLst xmlns:p15="http://schemas.microsoft.com/office/powerpoint/2012/main"/>
+    </p:ext>
+  </p:extLst>
 </p:presentation>
 </file>
 
@@ -5674,7 +5679,7 @@
         <p:spPr>
           <a:xfrm>
             <a:off x="396185" y="248575"/>
-            <a:ext cx="6375680" cy="6244300"/>
+            <a:ext cx="6375680" cy="5877017"/>
           </a:xfrm>
         </p:spPr>
       </p:pic>
@@ -5693,7 +5698,7 @@
         <p:spPr>
           <a:xfrm>
             <a:off x="7359588" y="514905"/>
-            <a:ext cx="4270161" cy="4524315"/>
+            <a:ext cx="4270161" cy="5355312"/>
           </a:xfrm>
           <a:prstGeom prst="rect">
             <a:avLst/>
@@ -5772,6 +5777,57 @@
                 <a:cs typeface="Times New Roman" panose="02020603050405020304" pitchFamily="18" charset="0"/>
               </a:rPr>
               <a:t>Different document representation (neither pair of the three are identical) for 3 classifiers</a:t>
+            </a:r>
+          </a:p>
+          <a:p>
+            <a:pPr marL="800100" lvl="1" indent="-342900">
+              <a:buFont typeface="+mj-lt"/>
+              <a:buAutoNum type="arabicPeriod"/>
+            </a:pPr>
+            <a:r>
+              <a:rPr lang="en-SG" dirty="0">
+                <a:latin typeface="Times New Roman" panose="02020603050405020304" pitchFamily="18" charset="0"/>
+                <a:cs typeface="Times New Roman" panose="02020603050405020304" pitchFamily="18" charset="0"/>
+              </a:rPr>
+              <a:t>Compare the differences in performances with (possibly) self-training or co-training models</a:t>
+            </a:r>
+          </a:p>
+        </p:txBody>
+      </p:sp>
+      <p:sp>
+        <p:nvSpPr>
+          <p:cNvPr id="2" name="TextBox 1">
+            <a:extLst>
+              <a:ext uri="{FF2B5EF4-FFF2-40B4-BE49-F238E27FC236}">
+                <a16:creationId xmlns:a16="http://schemas.microsoft.com/office/drawing/2014/main" id="{6C000075-AD2D-4BDF-9F4C-8DC8A7216624}"/>
+              </a:ext>
+            </a:extLst>
+          </p:cNvPr>
+          <p:cNvSpPr txBox="1"/>
+          <p:nvPr/>
+        </p:nvSpPr>
+        <p:spPr>
+          <a:xfrm>
+            <a:off x="745724" y="6303146"/>
+            <a:ext cx="5672831" cy="372862"/>
+          </a:xfrm>
+          <a:prstGeom prst="rect">
+            <a:avLst/>
+          </a:prstGeom>
+          <a:noFill/>
+        </p:spPr>
+        <p:txBody>
+          <a:bodyPr wrap="square" rtlCol="0">
+            <a:spAutoFit/>
+          </a:bodyPr>
+          <a:lstStyle/>
+          <a:p>
+            <a:r>
+              <a:rPr lang="en-SG" dirty="0">
+                <a:latin typeface="Times New Roman" panose="02020603050405020304" pitchFamily="18" charset="0"/>
+                <a:cs typeface="Times New Roman" panose="02020603050405020304" pitchFamily="18" charset="0"/>
+              </a:rPr>
+              <a:t>Results in the red box have been reproduced</a:t>
             </a:r>
           </a:p>
         </p:txBody>

</xml_diff>